<commit_message>
Aggiustato colore label aggiornamento e aggiustato file di generazione DataBase
</commit_message>
<xml_diff>
--- a/Documentazione/Presentazione.pptx
+++ b/Documentazione/Presentazione.pptx
@@ -125,6 +125,10 @@
     </p:ext>
   </p:extLst>
 </p:presentation>
+</file>
+
+<file path=ppt/revisionInfo.xml><?xml version="1.0" encoding="utf-8"?>
+<p1510:revInfo xmlns:a="http://schemas.openxmlformats.org/drawingml/2006/main" xmlns:r="http://schemas.openxmlformats.org/officeDocument/2006/relationships" xmlns:p1510="http://schemas.microsoft.com/office/powerpoint/2015/10/main"/>
 </file>
 
 <file path=ppt/slideLayouts/slideLayout1.xml><?xml version="1.0" encoding="utf-8"?>
@@ -3528,8 +3532,8 @@
         </p:nvSpPr>
         <p:spPr>
           <a:xfrm>
-            <a:off x="2294992" y="4404453"/>
-            <a:ext cx="2772229" cy="553998"/>
+            <a:off x="1406236" y="4508856"/>
+            <a:ext cx="3909391" cy="707886"/>
           </a:xfrm>
           <a:prstGeom prst="rect">
             <a:avLst/>
@@ -3543,15 +3547,15 @@
           <a:lstStyle/>
           <a:p>
             <a:r>
-              <a:rPr lang="it-IT" sz="3000" i="1" dirty="0">
+              <a:rPr lang="it-IT" sz="4000" dirty="0">
                 <a:solidFill>
                   <a:schemeClr val="bg1"/>
                 </a:solidFill>
                 <a:effectLst>
-                  <a:outerShdw blurRad="50800" dist="38100" dir="2700000" algn="tl" rotWithShape="0">
-                    <a:prstClr val="black">
-                      <a:alpha val="40000"/>
-                    </a:prstClr>
+                  <a:outerShdw blurRad="38100" dist="38100" dir="2700000" algn="tl">
+                    <a:srgbClr val="000000">
+                      <a:alpha val="43137"/>
+                    </a:srgbClr>
                   </a:outerShdw>
                 </a:effectLst>
                 <a:latin typeface="Bell MT" panose="02020503060305020303" pitchFamily="18" charset="0"/>
@@ -3577,8 +3581,8 @@
         </p:nvSpPr>
         <p:spPr>
           <a:xfrm>
-            <a:off x="7204606" y="4375425"/>
-            <a:ext cx="2692401" cy="553998"/>
+            <a:off x="7272129" y="4508856"/>
+            <a:ext cx="3801008" cy="707886"/>
           </a:xfrm>
           <a:prstGeom prst="rect">
             <a:avLst/>
@@ -3592,7 +3596,7 @@
           <a:lstStyle/>
           <a:p>
             <a:r>
-              <a:rPr lang="it-IT" sz="3000" i="1" dirty="0">
+              <a:rPr lang="it-IT" sz="4000" dirty="0">
                 <a:solidFill>
                   <a:schemeClr val="bg1"/>
                 </a:solidFill>
@@ -3762,13 +3766,13 @@
   <p:clrMapOvr>
     <a:masterClrMapping/>
   </p:clrMapOvr>
-  <mc:AlternateContent xmlns:mc="http://schemas.openxmlformats.org/markup-compatibility/2006">
-    <mc:Choice xmlns:p15="http://schemas.microsoft.com/office/powerpoint/2012/main" Requires="p15">
+  <mc:AlternateContent xmlns:mc="http://schemas.openxmlformats.org/markup-compatibility/2006" xmlns:p15="http://schemas.microsoft.com/office/powerpoint/2012/main">
+    <mc:Choice Requires="p15">
       <p:transition xmlns:p14="http://schemas.microsoft.com/office/powerpoint/2010/main" spd="slow" p14:dur="3000">
         <p15:prstTrans prst="curtains"/>
       </p:transition>
     </mc:Choice>
-    <mc:Fallback>
+    <mc:Fallback xmlns="">
       <p:transition spd="slow">
         <p:fade/>
       </p:transition>
@@ -4673,13 +4677,13 @@
   <p:clrMapOvr>
     <a:masterClrMapping/>
   </p:clrMapOvr>
-  <mc:AlternateContent xmlns:mc="http://schemas.openxmlformats.org/markup-compatibility/2006">
-    <mc:Choice xmlns:p14="http://schemas.microsoft.com/office/powerpoint/2010/main" Requires="p14">
+  <mc:AlternateContent xmlns:mc="http://schemas.openxmlformats.org/markup-compatibility/2006" xmlns:p14="http://schemas.microsoft.com/office/powerpoint/2010/main">
+    <mc:Choice Requires="p14">
       <p:transition spd="slow" p14:dur="2000">
         <p:blinds dir="vert"/>
       </p:transition>
     </mc:Choice>
-    <mc:Fallback>
+    <mc:Fallback xmlns="">
       <p:transition spd="slow">
         <p:blinds dir="vert"/>
       </p:transition>
@@ -5164,13 +5168,13 @@
   <p:clrMapOvr>
     <a:masterClrMapping/>
   </p:clrMapOvr>
-  <mc:AlternateContent xmlns:mc="http://schemas.openxmlformats.org/markup-compatibility/2006">
-    <mc:Choice xmlns:p15="http://schemas.microsoft.com/office/powerpoint/2012/main" Requires="p15">
+  <mc:AlternateContent xmlns:mc="http://schemas.openxmlformats.org/markup-compatibility/2006" xmlns:p15="http://schemas.microsoft.com/office/powerpoint/2012/main">
+    <mc:Choice Requires="p15">
       <p:transition xmlns:p14="http://schemas.microsoft.com/office/powerpoint/2010/main" spd="slow" p14:dur="2000">
         <p15:prstTrans prst="drape"/>
       </p:transition>
     </mc:Choice>
-    <mc:Fallback>
+    <mc:Fallback xmlns="">
       <p:transition spd="slow">
         <p:fade/>
       </p:transition>

</xml_diff>